<commit_message>
* game on... :-)
</commit_message>
<xml_diff>
--- a/2012-03-12_Aleksandra Kurbatova_Jan Rehwaldt_Human-Computer Interaction.pptx
+++ b/2012-03-12_Aleksandra Kurbatova_Jan Rehwaldt_Human-Computer Interaction.pptx
@@ -15571,15 +15571,7 @@
           <a:p>
             <a:r>
               <a:rPr lang="en-US" dirty="0" smtClean="0"/>
-              <a:t>HCI </a:t>
-            </a:r>
-            <a:r>
-              <a:rPr lang="en-US" smtClean="0"/>
-              <a:t>innovates computer usage </a:t>
-            </a:r>
-            <a:r>
-              <a:rPr lang="en-US" dirty="0" smtClean="0"/>
-              <a:t>techniques</a:t>
+              <a:t>HCI innovates computer usage techniques</a:t>
             </a:r>
             <a:endParaRPr lang="en-US" dirty="0"/>
           </a:p>

</xml_diff>